<commit_message>
Update ppt with system running photo
</commit_message>
<xml_diff>
--- a/relazione/Marchetti_815990_assignment1.pptx
+++ b/relazione/Marchetti_815990_assignment1.pptx
@@ -6,10 +6,10 @@
     <p:sldMasterId id="2147484040" r:id="rId2"/>
   </p:sldMasterIdLst>
   <p:notesMasterIdLst>
-    <p:notesMasterId r:id="rId8"/>
+    <p:notesMasterId r:id="rId9"/>
   </p:notesMasterIdLst>
   <p:handoutMasterIdLst>
-    <p:handoutMasterId r:id="rId9"/>
+    <p:handoutMasterId r:id="rId10"/>
   </p:handoutMasterIdLst>
   <p:sldIdLst>
     <p:sldId id="388" r:id="rId3"/>
@@ -17,50 +17,51 @@
     <p:sldId id="389" r:id="rId5"/>
     <p:sldId id="404" r:id="rId6"/>
     <p:sldId id="405" r:id="rId7"/>
+    <p:sldId id="406" r:id="rId8"/>
   </p:sldIdLst>
   <p:sldSz cx="12192000" cy="6858000"/>
   <p:notesSz cx="6858000" cy="9144000"/>
   <p:embeddedFontLst>
     <p:embeddedFont>
       <p:font typeface="Calibri" panose="020F0502020204030204" pitchFamily="34" charset="0"/>
-      <p:regular r:id="rId10"/>
-      <p:bold r:id="rId11"/>
-      <p:italic r:id="rId12"/>
-      <p:boldItalic r:id="rId13"/>
+      <p:regular r:id="rId11"/>
+      <p:bold r:id="rId12"/>
+      <p:italic r:id="rId13"/>
+      <p:boldItalic r:id="rId14"/>
     </p:embeddedFont>
     <p:embeddedFont>
       <p:font typeface="Cascadia Code" panose="020B0609020000020004" pitchFamily="49" charset="0"/>
-      <p:regular r:id="rId14"/>
-      <p:bold r:id="rId15"/>
+      <p:regular r:id="rId15"/>
+      <p:bold r:id="rId16"/>
     </p:embeddedFont>
     <p:embeddedFont>
       <p:font typeface="Cascadia Mono" panose="020B0609020000020004" pitchFamily="49" charset="0"/>
-      <p:regular r:id="rId16"/>
-      <p:bold r:id="rId17"/>
+      <p:regular r:id="rId17"/>
+      <p:bold r:id="rId18"/>
     </p:embeddedFont>
     <p:embeddedFont>
       <p:font typeface="Montserrat" panose="00000500000000000000" pitchFamily="2" charset="0"/>
-      <p:regular r:id="rId18"/>
-      <p:bold r:id="rId19"/>
-      <p:italic r:id="rId20"/>
-      <p:boldItalic r:id="rId21"/>
+      <p:regular r:id="rId19"/>
+      <p:bold r:id="rId20"/>
+      <p:italic r:id="rId21"/>
+      <p:boldItalic r:id="rId22"/>
     </p:embeddedFont>
     <p:embeddedFont>
       <p:font typeface="Montserrat Medium" panose="00000600000000000000" pitchFamily="2" charset="0"/>
-      <p:regular r:id="rId22"/>
-      <p:italic r:id="rId23"/>
+      <p:regular r:id="rId23"/>
+      <p:italic r:id="rId24"/>
     </p:embeddedFont>
     <p:embeddedFont>
       <p:font typeface="Montserrat SemiBold" panose="00000700000000000000" pitchFamily="2" charset="0"/>
-      <p:bold r:id="rId24"/>
-      <p:boldItalic r:id="rId25"/>
+      <p:bold r:id="rId25"/>
+      <p:boldItalic r:id="rId26"/>
     </p:embeddedFont>
     <p:embeddedFont>
       <p:font typeface="Open Sans" panose="020B0606030504020204" pitchFamily="34" charset="0"/>
-      <p:regular r:id="rId26"/>
-      <p:bold r:id="rId27"/>
-      <p:italic r:id="rId28"/>
-      <p:boldItalic r:id="rId29"/>
+      <p:regular r:id="rId27"/>
+      <p:bold r:id="rId28"/>
+      <p:italic r:id="rId29"/>
+      <p:boldItalic r:id="rId30"/>
     </p:embeddedFont>
   </p:embeddedFontLst>
   <p:defaultTextStyle>
@@ -180,6 +181,7 @@
         <p14:section name="Final remarks" id="{427B06BD-D007-43B1-A5E3-4604E2C03997}">
           <p14:sldIdLst>
             <p14:sldId id="405"/>
+            <p14:sldId id="406"/>
           </p14:sldIdLst>
         </p14:section>
       </p14:sectionLst>
@@ -3598,7 +3600,7 @@
           <a:p>
             <a:fld id="{A740EBAF-D955-C443-AB02-2BCBC7797572}" type="datetimeFigureOut">
               <a:rPr lang="en-US" smtClean="0"/>
-              <a:t>5/9/2021</a:t>
+              <a:t>5/10/2021</a:t>
             </a:fld>
             <a:endParaRPr lang="en-US"/>
           </a:p>
@@ -3763,7 +3765,7 @@
           <a:p>
             <a:fld id="{247A641A-FC50-3840-A830-42D90553FE8C}" type="datetimeFigureOut">
               <a:rPr lang="en-US" smtClean="0"/>
-              <a:t>5/9/2021</a:t>
+              <a:t>5/10/2021</a:t>
             </a:fld>
             <a:endParaRPr lang="en-US"/>
           </a:p>
@@ -7187,14 +7189,14 @@
           <p:nvPr>
             <p:extLst>
               <p:ext uri="{D42A27DB-BD31-4B8C-83A1-F6EECF244321}">
-                <p14:modId xmlns:p14="http://schemas.microsoft.com/office/powerpoint/2010/main" val="810555774"/>
+                <p14:modId xmlns:p14="http://schemas.microsoft.com/office/powerpoint/2010/main" val="353216771"/>
               </p:ext>
             </p:extLst>
           </p:nvPr>
         </p:nvGraphicFramePr>
         <p:xfrm>
-          <a:off x="2683239" y="2410825"/>
-          <a:ext cx="6775554" cy="2776011"/>
+          <a:off x="1302027" y="2027583"/>
+          <a:ext cx="9905728" cy="3159253"/>
         </p:xfrm>
         <a:graphic>
           <a:graphicData uri="http://schemas.openxmlformats.org/drawingml/2006/table">
@@ -7203,79 +7205,29 @@
                 <a:tableStyleId>{7E9639D4-E3E2-4D34-9284-5A2195B3D0D7}</a:tableStyleId>
               </a:tblPr>
               <a:tblGrid>
-                <a:gridCol w="1576781">
-                  <a:extLst>
-                    <a:ext uri="{9D8B030D-6E8A-4147-A177-3AD203B41FA5}">
-                      <a16:colId xmlns:a16="http://schemas.microsoft.com/office/drawing/2014/main" val="1299426354"/>
-                    </a:ext>
-                  </a:extLst>
-                </a:gridCol>
-                <a:gridCol w="3992065">
+                <a:gridCol w="3841155">
                   <a:extLst>
                     <a:ext uri="{9D8B030D-6E8A-4147-A177-3AD203B41FA5}">
                       <a16:colId xmlns:a16="http://schemas.microsoft.com/office/drawing/2014/main" val="3663815984"/>
                     </a:ext>
                   </a:extLst>
                 </a:gridCol>
-                <a:gridCol w="1206708">
+                <a:gridCol w="1080252">
                   <a:extLst>
                     <a:ext uri="{9D8B030D-6E8A-4147-A177-3AD203B41FA5}">
                       <a16:colId xmlns:a16="http://schemas.microsoft.com/office/drawing/2014/main" val="2141858246"/>
                     </a:ext>
                   </a:extLst>
                 </a:gridCol>
+                <a:gridCol w="4984321">
+                  <a:extLst>
+                    <a:ext uri="{9D8B030D-6E8A-4147-A177-3AD203B41FA5}">
+                      <a16:colId xmlns:a16="http://schemas.microsoft.com/office/drawing/2014/main" val="3896863739"/>
+                    </a:ext>
+                  </a:extLst>
+                </a:gridCol>
               </a:tblGrid>
-              <a:tr h="428163">
-                <a:tc>
-                  <a:txBody>
-                    <a:bodyPr/>
-                    <a:lstStyle/>
-                    <a:p>
-                      <a:endParaRPr lang="it-IT" sz="1400" b="1" dirty="0">
-                        <a:latin typeface="Montserrat SemiBold" panose="00000700000000000000" pitchFamily="50" charset="0"/>
-                        <a:cs typeface="Cascadia Mono" panose="020B0609020000020004" pitchFamily="49" charset="0"/>
-                      </a:endParaRPr>
-                    </a:p>
-                  </a:txBody>
-                  <a:tcPr marL="100584" marR="100584" marT="41564" marB="41564" anchor="ctr">
-                    <a:lnL w="12700" cap="flat" cmpd="sng" algn="ctr">
-                      <a:solidFill>
-                        <a:schemeClr val="tx1"/>
-                      </a:solidFill>
-                      <a:prstDash val="solid"/>
-                      <a:round/>
-                      <a:headEnd type="none" w="med" len="med"/>
-                      <a:tailEnd type="none" w="med" len="med"/>
-                    </a:lnL>
-                    <a:lnR w="12700" cap="flat" cmpd="sng" algn="ctr">
-                      <a:solidFill>
-                        <a:schemeClr val="tx1"/>
-                      </a:solidFill>
-                      <a:prstDash val="solid"/>
-                      <a:round/>
-                      <a:headEnd type="none" w="med" len="med"/>
-                      <a:tailEnd type="none" w="med" len="med"/>
-                    </a:lnR>
-                    <a:lnT w="12700" cap="flat" cmpd="sng" algn="ctr">
-                      <a:solidFill>
-                        <a:schemeClr val="tx1"/>
-                      </a:solidFill>
-                      <a:prstDash val="solid"/>
-                      <a:round/>
-                      <a:headEnd type="none" w="med" len="med"/>
-                      <a:tailEnd type="none" w="med" len="med"/>
-                    </a:lnT>
-                    <a:lnB w="12700" cap="flat" cmpd="sng" algn="ctr">
-                      <a:solidFill>
-                        <a:schemeClr val="tx1"/>
-                      </a:solidFill>
-                      <a:prstDash val="solid"/>
-                      <a:round/>
-                      <a:headEnd type="none" w="med" len="med"/>
-                      <a:tailEnd type="none" w="med" len="med"/>
-                    </a:lnB>
-                  </a:tcPr>
-                </a:tc>
+              <a:tr h="487273">
                 <a:tc>
                   <a:txBody>
                     <a:bodyPr/>
@@ -7387,40 +7339,36 @@
                     </a:lnB>
                   </a:tcPr>
                 </a:tc>
-                <a:extLst>
-                  <a:ext uri="{0D108BD9-81ED-4DB2-BD59-A6C34878D82A}">
-                    <a16:rowId xmlns:a16="http://schemas.microsoft.com/office/drawing/2014/main" val="2138192544"/>
-                  </a:ext>
-                </a:extLst>
-              </a:tr>
-              <a:tr h="391308">
-                <a:tc rowSpan="4">
+                <a:tc>
                   <a:txBody>
                     <a:bodyPr/>
                     <a:lstStyle/>
                     <a:p>
-                      <a:pPr algn="ctr"/>
+                      <a:pPr algn="l"/>
                       <a:r>
-                        <a:rPr lang="it-IT" sz="1400" dirty="0">
-                          <a:solidFill>
-                            <a:srgbClr val="1F1F1F"/>
-                          </a:solidFill>
-                          <a:latin typeface="Cascadia Mono" panose="020B0609020000020004" pitchFamily="49" charset="0"/>
+                        <a:rPr lang="it-IT" sz="1400" b="1" dirty="0" err="1">
+                          <a:latin typeface="Montserrat SemiBold" panose="00000700000000000000" pitchFamily="50" charset="0"/>
                           <a:cs typeface="Cascadia Mono" panose="020B0609020000020004" pitchFamily="49" charset="0"/>
                         </a:rPr>
-                        <a:t>Sensors</a:t>
+                        <a:t>Description</a:t>
                       </a:r>
-                      <a:endParaRPr lang="en-US" sz="1400" dirty="0">
-                        <a:solidFill>
-                          <a:srgbClr val="1F1F1F"/>
-                        </a:solidFill>
-                        <a:latin typeface="Cascadia Mono" panose="020B0609020000020004" pitchFamily="49" charset="0"/>
+                      <a:endParaRPr lang="it-IT" sz="1400" b="1" dirty="0">
+                        <a:latin typeface="Montserrat SemiBold" panose="00000700000000000000" pitchFamily="50" charset="0"/>
                         <a:cs typeface="Cascadia Mono" panose="020B0609020000020004" pitchFamily="49" charset="0"/>
                       </a:endParaRPr>
                     </a:p>
                   </a:txBody>
                   <a:tcPr marL="100584" marR="100584" marT="41564" marB="41564" anchor="ctr">
-                    <a:lnR w="6350" cap="flat" cmpd="sng" algn="ctr">
+                    <a:lnL w="12700" cap="flat" cmpd="sng" algn="ctr">
+                      <a:solidFill>
+                        <a:schemeClr val="tx1"/>
+                      </a:solidFill>
+                      <a:prstDash val="solid"/>
+                      <a:round/>
+                      <a:headEnd type="none" w="med" len="med"/>
+                      <a:tailEnd type="none" w="med" len="med"/>
+                    </a:lnL>
+                    <a:lnR w="12700" cap="flat" cmpd="sng" algn="ctr">
                       <a:solidFill>
                         <a:schemeClr val="tx1"/>
                       </a:solidFill>
@@ -7438,7 +7386,7 @@
                       <a:headEnd type="none" w="med" len="med"/>
                       <a:tailEnd type="none" w="med" len="med"/>
                     </a:lnT>
-                    <a:lnB w="6350" cap="flat" cmpd="sng" algn="ctr">
+                    <a:lnB w="12700" cap="flat" cmpd="sng" algn="ctr">
                       <a:solidFill>
                         <a:schemeClr val="tx1"/>
                       </a:solidFill>
@@ -7449,6 +7397,13 @@
                     </a:lnB>
                   </a:tcPr>
                 </a:tc>
+                <a:extLst>
+                  <a:ext uri="{0D108BD9-81ED-4DB2-BD59-A6C34878D82A}">
+                    <a16:rowId xmlns:a16="http://schemas.microsoft.com/office/drawing/2014/main" val="2138192544"/>
+                  </a:ext>
+                </a:extLst>
+              </a:tr>
+              <a:tr h="445330">
                 <a:tc>
                   <a:txBody>
                     <a:bodyPr/>
@@ -7462,8 +7417,35 @@
                           <a:latin typeface="Cascadia Mono" panose="020B0609020000020004" pitchFamily="49" charset="0"/>
                           <a:cs typeface="Cascadia Mono" panose="020B0609020000020004" pitchFamily="49" charset="0"/>
                         </a:rPr>
-                        <a:t>DHT11</a:t>
+                        <a:t>DHT11 + 10k</a:t>
                       </a:r>
+                      <a:r>
+                        <a:rPr lang="el-GR" sz="1400" dirty="0">
+                          <a:solidFill>
+                            <a:srgbClr val="1F1F1F"/>
+                          </a:solidFill>
+                          <a:latin typeface="Cascadia Mono" panose="020B0609020000020004" pitchFamily="49" charset="0"/>
+                          <a:cs typeface="Cascadia Mono" panose="020B0609020000020004" pitchFamily="49" charset="0"/>
+                        </a:rPr>
+                        <a:t>Ω</a:t>
+                      </a:r>
+                      <a:r>
+                        <a:rPr lang="en-US" sz="1400" dirty="0">
+                          <a:solidFill>
+                            <a:srgbClr val="1F1F1F"/>
+                          </a:solidFill>
+                          <a:latin typeface="Cascadia Mono" panose="020B0609020000020004" pitchFamily="49" charset="0"/>
+                          <a:cs typeface="Cascadia Mono" panose="020B0609020000020004" pitchFamily="49" charset="0"/>
+                        </a:rPr>
+                        <a:t> resistor</a:t>
+                      </a:r>
+                      <a:endParaRPr lang="it-IT" sz="1400" dirty="0">
+                        <a:solidFill>
+                          <a:srgbClr val="1F1F1F"/>
+                        </a:solidFill>
+                        <a:latin typeface="Cascadia Mono" panose="020B0609020000020004" pitchFamily="49" charset="0"/>
+                        <a:cs typeface="Cascadia Mono" panose="020B0609020000020004" pitchFamily="49" charset="0"/>
+                      </a:endParaRPr>
                     </a:p>
                   </a:txBody>
                   <a:tcPr marL="100584" marR="100584" marT="41564" marB="41564" anchor="ctr">
@@ -7524,32 +7506,60 @@
                     </a:lnT>
                   </a:tcPr>
                 </a:tc>
+                <a:tc>
+                  <a:txBody>
+                    <a:bodyPr/>
+                    <a:lstStyle/>
+                    <a:p>
+                      <a:pPr algn="l"/>
+                      <a:r>
+                        <a:rPr lang="it-IT" sz="1400" dirty="0">
+                          <a:solidFill>
+                            <a:srgbClr val="1F1F1F"/>
+                          </a:solidFill>
+                          <a:latin typeface="Cascadia Mono" panose="020B0609020000020004" pitchFamily="49" charset="0"/>
+                          <a:cs typeface="Cascadia Mono" panose="020B0609020000020004" pitchFamily="49" charset="0"/>
+                        </a:rPr>
+                        <a:t>Monitor temperature/</a:t>
+                      </a:r>
+                      <a:r>
+                        <a:rPr lang="it-IT" sz="1400" dirty="0" err="1">
+                          <a:solidFill>
+                            <a:srgbClr val="1F1F1F"/>
+                          </a:solidFill>
+                          <a:latin typeface="Cascadia Mono" panose="020B0609020000020004" pitchFamily="49" charset="0"/>
+                          <a:cs typeface="Cascadia Mono" panose="020B0609020000020004" pitchFamily="49" charset="0"/>
+                        </a:rPr>
+                        <a:t>humidity</a:t>
+                      </a:r>
+                      <a:endParaRPr lang="it-IT" sz="1400" dirty="0">
+                        <a:solidFill>
+                          <a:srgbClr val="1F1F1F"/>
+                        </a:solidFill>
+                        <a:latin typeface="Cascadia Mono" panose="020B0609020000020004" pitchFamily="49" charset="0"/>
+                        <a:cs typeface="Cascadia Mono" panose="020B0609020000020004" pitchFamily="49" charset="0"/>
+                      </a:endParaRPr>
+                    </a:p>
+                  </a:txBody>
+                  <a:tcPr marL="100584" marR="100584" marT="41564" marB="41564" anchor="ctr">
+                    <a:lnT w="12700" cap="flat" cmpd="sng" algn="ctr">
+                      <a:solidFill>
+                        <a:schemeClr val="tx1"/>
+                      </a:solidFill>
+                      <a:prstDash val="solid"/>
+                      <a:round/>
+                      <a:headEnd type="none" w="med" len="med"/>
+                      <a:tailEnd type="none" w="med" len="med"/>
+                    </a:lnT>
+                  </a:tcPr>
+                </a:tc>
                 <a:extLst>
                   <a:ext uri="{0D108BD9-81ED-4DB2-BD59-A6C34878D82A}">
                     <a16:rowId xmlns:a16="http://schemas.microsoft.com/office/drawing/2014/main" val="1285090662"/>
                   </a:ext>
                 </a:extLst>
               </a:tr>
-              <a:tr h="391308">
-                <a:tc vMerge="1">
-                  <a:txBody>
-                    <a:bodyPr/>
-                    <a:lstStyle/>
-                    <a:p>
-                      <a:r>
-                        <a:rPr lang="en-US" sz="1200" dirty="0">
-                          <a:solidFill>
-                            <a:srgbClr val="1F1F1F"/>
-                          </a:solidFill>
-                          <a:latin typeface="Cascadia Mono" panose="020B0609020000020004" pitchFamily="49" charset="0"/>
-                          <a:cs typeface="Cascadia Mono" panose="020B0609020000020004" pitchFamily="49" charset="0"/>
-                        </a:rPr>
-                        <a:t>HW Sensor</a:t>
-                      </a:r>
-                    </a:p>
-                  </a:txBody>
-                  <a:tcPr marL="100584" marR="100584" marT="41564" marB="41564" anchor="ctr"/>
-                </a:tc>
+              <a:tr h="445330">
                 <a:tc>
                   <a:txBody>
                     <a:bodyPr/>
@@ -7563,7 +7573,27 @@
                           <a:latin typeface="Cascadia Mono" panose="020B0609020000020004" pitchFamily="49" charset="0"/>
                           <a:cs typeface="Cascadia Mono" panose="020B0609020000020004" pitchFamily="49" charset="0"/>
                         </a:rPr>
-                        <a:t>Photoresistor</a:t>
+                        <a:t>Photoresistor + 10k</a:t>
+                      </a:r>
+                      <a:r>
+                        <a:rPr lang="el-GR" sz="1400" dirty="0">
+                          <a:solidFill>
+                            <a:srgbClr val="1F1F1F"/>
+                          </a:solidFill>
+                          <a:latin typeface="Cascadia Mono" panose="020B0609020000020004" pitchFamily="49" charset="0"/>
+                          <a:cs typeface="Cascadia Mono" panose="020B0609020000020004" pitchFamily="49" charset="0"/>
+                        </a:rPr>
+                        <a:t>Ω</a:t>
+                      </a:r>
+                      <a:r>
+                        <a:rPr lang="en-US" sz="1400" dirty="0">
+                          <a:solidFill>
+                            <a:srgbClr val="1F1F1F"/>
+                          </a:solidFill>
+                          <a:latin typeface="Cascadia Mono" panose="020B0609020000020004" pitchFamily="49" charset="0"/>
+                          <a:cs typeface="Cascadia Mono" panose="020B0609020000020004" pitchFamily="49" charset="0"/>
+                        </a:rPr>
+                        <a:t> resistor</a:t>
                       </a:r>
                     </a:p>
                   </a:txBody>
@@ -7599,32 +7629,33 @@
                   </a:txBody>
                   <a:tcPr marL="100584" marR="100584" marT="41564" marB="41564" anchor="ctr"/>
                 </a:tc>
+                <a:tc>
+                  <a:txBody>
+                    <a:bodyPr/>
+                    <a:lstStyle/>
+                    <a:p>
+                      <a:pPr algn="l"/>
+                      <a:r>
+                        <a:rPr lang="en-US" sz="1400" dirty="0">
+                          <a:solidFill>
+                            <a:srgbClr val="1F1F1F"/>
+                          </a:solidFill>
+                          <a:latin typeface="Cascadia Mono" panose="020B0609020000020004" pitchFamily="49" charset="0"/>
+                          <a:cs typeface="Cascadia Mono" panose="020B0609020000020004" pitchFamily="49" charset="0"/>
+                        </a:rPr>
+                        <a:t>Monitor the light amount</a:t>
+                      </a:r>
+                    </a:p>
+                  </a:txBody>
+                  <a:tcPr marL="100584" marR="100584" marT="41564" marB="41564" anchor="ctr"/>
+                </a:tc>
                 <a:extLst>
                   <a:ext uri="{0D108BD9-81ED-4DB2-BD59-A6C34878D82A}">
                     <a16:rowId xmlns:a16="http://schemas.microsoft.com/office/drawing/2014/main" val="3930323301"/>
                   </a:ext>
                 </a:extLst>
               </a:tr>
-              <a:tr h="391308">
-                <a:tc vMerge="1">
-                  <a:txBody>
-                    <a:bodyPr/>
-                    <a:lstStyle/>
-                    <a:p>
-                      <a:r>
-                        <a:rPr lang="en-US" sz="1200" dirty="0">
-                          <a:solidFill>
-                            <a:srgbClr val="1F1F1F"/>
-                          </a:solidFill>
-                          <a:latin typeface="Cascadia Mono" panose="020B0609020000020004" pitchFamily="49" charset="0"/>
-                          <a:cs typeface="Cascadia Mono" panose="020B0609020000020004" pitchFamily="49" charset="0"/>
-                        </a:rPr>
-                        <a:t>HW Sensor</a:t>
-                      </a:r>
-                    </a:p>
-                  </a:txBody>
-                  <a:tcPr marL="100584" marR="100584" marT="41564" marB="41564" anchor="ctr"/>
-                </a:tc>
+              <a:tr h="445330">
                 <a:tc>
                   <a:txBody>
                     <a:bodyPr/>
@@ -7674,29 +7705,33 @@
                   </a:txBody>
                   <a:tcPr marL="100584" marR="100584" marT="41564" marB="41564" anchor="ctr"/>
                 </a:tc>
+                <a:tc>
+                  <a:txBody>
+                    <a:bodyPr/>
+                    <a:lstStyle/>
+                    <a:p>
+                      <a:pPr algn="l"/>
+                      <a:r>
+                        <a:rPr lang="en-US" sz="1400" dirty="0">
+                          <a:solidFill>
+                            <a:srgbClr val="1F1F1F"/>
+                          </a:solidFill>
+                          <a:latin typeface="Cascadia Mono" panose="020B0609020000020004" pitchFamily="49" charset="0"/>
+                          <a:cs typeface="Cascadia Mono" panose="020B0609020000020004" pitchFamily="49" charset="0"/>
+                        </a:rPr>
+                        <a:t>Monitor the soil moisture</a:t>
+                      </a:r>
+                    </a:p>
+                  </a:txBody>
+                  <a:tcPr marL="100584" marR="100584" marT="41564" marB="41564" anchor="ctr"/>
+                </a:tc>
                 <a:extLst>
                   <a:ext uri="{0D108BD9-81ED-4DB2-BD59-A6C34878D82A}">
                     <a16:rowId xmlns:a16="http://schemas.microsoft.com/office/drawing/2014/main" val="2788911024"/>
                   </a:ext>
                 </a:extLst>
               </a:tr>
-              <a:tr h="391308">
-                <a:tc vMerge="1">
-                  <a:txBody>
-                    <a:bodyPr/>
-                    <a:lstStyle/>
-                    <a:p>
-                      <a:endParaRPr lang="en-US" sz="1200" dirty="0">
-                        <a:solidFill>
-                          <a:srgbClr val="1F1F1F"/>
-                        </a:solidFill>
-                        <a:latin typeface="Cascadia Mono" panose="020B0609020000020004" pitchFamily="49" charset="0"/>
-                        <a:cs typeface="Cascadia Mono" panose="020B0609020000020004" pitchFamily="49" charset="0"/>
-                      </a:endParaRPr>
-                    </a:p>
-                  </a:txBody>
-                  <a:tcPr marL="100584" marR="100584" marT="41564" marB="41564" anchor="ctr"/>
-                </a:tc>
+              <a:tr h="445330">
                 <a:tc>
                   <a:txBody>
                     <a:bodyPr/>
@@ -7746,19 +7781,12 @@
                   </a:txBody>
                   <a:tcPr marL="100584" marR="100584" marT="41564" marB="41564" anchor="ctr"/>
                 </a:tc>
-                <a:extLst>
-                  <a:ext uri="{0D108BD9-81ED-4DB2-BD59-A6C34878D82A}">
-                    <a16:rowId xmlns:a16="http://schemas.microsoft.com/office/drawing/2014/main" val="1977789437"/>
-                  </a:ext>
-                </a:extLst>
-              </a:tr>
-              <a:tr h="391308">
-                <a:tc rowSpan="2">
+                <a:tc>
                   <a:txBody>
                     <a:bodyPr/>
                     <a:lstStyle/>
                     <a:p>
-                      <a:pPr algn="ctr"/>
+                      <a:pPr algn="l"/>
                       <a:r>
                         <a:rPr lang="en-US" sz="1400" dirty="0">
                           <a:solidFill>
@@ -7767,40 +7795,19 @@
                           <a:latin typeface="Cascadia Mono" panose="020B0609020000020004" pitchFamily="49" charset="0"/>
                           <a:cs typeface="Cascadia Mono" panose="020B0609020000020004" pitchFamily="49" charset="0"/>
                         </a:rPr>
-                        <a:t>Actuators</a:t>
+                        <a:t>Control information displayed on the LCD</a:t>
                       </a:r>
                     </a:p>
                   </a:txBody>
-                  <a:tcPr marL="100584" marR="100584" marT="41564" marB="41564" anchor="ctr">
-                    <a:lnR w="6350" cap="flat" cmpd="sng" algn="ctr">
-                      <a:solidFill>
-                        <a:schemeClr val="tx1"/>
-                      </a:solidFill>
-                      <a:prstDash val="solid"/>
-                      <a:round/>
-                      <a:headEnd type="none" w="med" len="med"/>
-                      <a:tailEnd type="none" w="med" len="med"/>
-                    </a:lnR>
-                    <a:lnT w="6350" cap="flat" cmpd="sng" algn="ctr">
-                      <a:solidFill>
-                        <a:schemeClr val="tx1"/>
-                      </a:solidFill>
-                      <a:prstDash val="solid"/>
-                      <a:round/>
-                      <a:headEnd type="none" w="med" len="med"/>
-                      <a:tailEnd type="none" w="med" len="med"/>
-                    </a:lnT>
-                    <a:lnB w="6350" cap="flat" cmpd="sng" algn="ctr">
-                      <a:solidFill>
-                        <a:schemeClr val="tx1"/>
-                      </a:solidFill>
-                      <a:prstDash val="solid"/>
-                      <a:round/>
-                      <a:headEnd type="none" w="med" len="med"/>
-                      <a:tailEnd type="none" w="med" len="med"/>
-                    </a:lnB>
-                  </a:tcPr>
+                  <a:tcPr marL="100584" marR="100584" marT="41564" marB="41564" anchor="ctr"/>
                 </a:tc>
+                <a:extLst>
+                  <a:ext uri="{0D108BD9-81ED-4DB2-BD59-A6C34878D82A}">
+                    <a16:rowId xmlns:a16="http://schemas.microsoft.com/office/drawing/2014/main" val="1977789437"/>
+                  </a:ext>
+                </a:extLst>
+              </a:tr>
+              <a:tr h="445330">
                 <a:tc>
                   <a:txBody>
                     <a:bodyPr/>
@@ -7850,29 +7857,33 @@
                   </a:txBody>
                   <a:tcPr marL="100584" marR="100584" marT="41564" marB="41564" anchor="ctr"/>
                 </a:tc>
+                <a:tc>
+                  <a:txBody>
+                    <a:bodyPr/>
+                    <a:lstStyle/>
+                    <a:p>
+                      <a:pPr algn="l"/>
+                      <a:r>
+                        <a:rPr lang="en-US" sz="1400" dirty="0">
+                          <a:solidFill>
+                            <a:srgbClr val="1F1F1F"/>
+                          </a:solidFill>
+                          <a:latin typeface="Cascadia Mono" panose="020B0609020000020004" pitchFamily="49" charset="0"/>
+                          <a:cs typeface="Cascadia Mono" panose="020B0609020000020004" pitchFamily="49" charset="0"/>
+                        </a:rPr>
+                        <a:t>Visualize system status</a:t>
+                      </a:r>
+                    </a:p>
+                  </a:txBody>
+                  <a:tcPr marL="100584" marR="100584" marT="41564" marB="41564" anchor="ctr"/>
+                </a:tc>
                 <a:extLst>
                   <a:ext uri="{0D108BD9-81ED-4DB2-BD59-A6C34878D82A}">
                     <a16:rowId xmlns:a16="http://schemas.microsoft.com/office/drawing/2014/main" val="4159999554"/>
                   </a:ext>
                 </a:extLst>
               </a:tr>
-              <a:tr h="391308">
-                <a:tc vMerge="1">
-                  <a:txBody>
-                    <a:bodyPr/>
-                    <a:lstStyle/>
-                    <a:p>
-                      <a:endParaRPr lang="en-US" sz="1200" dirty="0">
-                        <a:solidFill>
-                          <a:srgbClr val="1F1F1F"/>
-                        </a:solidFill>
-                        <a:latin typeface="Cascadia Mono" panose="020B0609020000020004" pitchFamily="49" charset="0"/>
-                        <a:cs typeface="Cascadia Mono" panose="020B0609020000020004" pitchFamily="49" charset="0"/>
-                      </a:endParaRPr>
-                    </a:p>
-                  </a:txBody>
-                  <a:tcPr marL="100584" marR="100584" marT="41564" marB="41564" anchor="ctr"/>
-                </a:tc>
+              <a:tr h="445330">
                 <a:tc>
                   <a:txBody>
                     <a:bodyPr/>
@@ -7922,6 +7933,26 @@
                   </a:txBody>
                   <a:tcPr marL="100584" marR="100584" marT="41564" marB="41564" anchor="ctr"/>
                 </a:tc>
+                <a:tc>
+                  <a:txBody>
+                    <a:bodyPr/>
+                    <a:lstStyle/>
+                    <a:p>
+                      <a:pPr algn="l"/>
+                      <a:r>
+                        <a:rPr lang="en-US" sz="1400" dirty="0">
+                          <a:solidFill>
+                            <a:srgbClr val="1F1F1F"/>
+                          </a:solidFill>
+                          <a:latin typeface="Cascadia Mono" panose="020B0609020000020004" pitchFamily="49" charset="0"/>
+                          <a:cs typeface="Cascadia Mono" panose="020B0609020000020004" pitchFamily="49" charset="0"/>
+                        </a:rPr>
+                        <a:t>Show the sensor details</a:t>
+                      </a:r>
+                    </a:p>
+                  </a:txBody>
+                  <a:tcPr marL="100584" marR="100584" marT="41564" marB="41564" anchor="ctr"/>
+                </a:tc>
                 <a:extLst>
                   <a:ext uri="{0D108BD9-81ED-4DB2-BD59-A6C34878D82A}">
                     <a16:rowId xmlns:a16="http://schemas.microsoft.com/office/drawing/2014/main" val="2319997970"/>
@@ -7932,42 +7963,6 @@
           </a:graphicData>
         </a:graphic>
       </p:graphicFrame>
-      <p:sp>
-        <p:nvSpPr>
-          <p:cNvPr id="5" name="CasellaDiTesto 4">
-            <a:extLst>
-              <a:ext uri="{FF2B5EF4-FFF2-40B4-BE49-F238E27FC236}">
-                <a16:creationId xmlns:a16="http://schemas.microsoft.com/office/drawing/2014/main" id="{60AFF3BA-146D-4AEC-B61F-EF88FE70DA2D}"/>
-              </a:ext>
-            </a:extLst>
-          </p:cNvPr>
-          <p:cNvSpPr txBox="1"/>
-          <p:nvPr/>
-        </p:nvSpPr>
-        <p:spPr>
-          <a:xfrm>
-            <a:off x="1794500" y="1669869"/>
-            <a:ext cx="7974143" cy="338554"/>
-          </a:xfrm>
-          <a:prstGeom prst="rect">
-            <a:avLst/>
-          </a:prstGeom>
-          <a:noFill/>
-        </p:spPr>
-        <p:txBody>
-          <a:bodyPr wrap="square" rtlCol="0">
-            <a:spAutoFit/>
-          </a:bodyPr>
-          <a:lstStyle/>
-          <a:p>
-            <a:r>
-              <a:rPr lang="en-US" sz="1600" dirty="0"/>
-              <a:t>Description of the ingredients employed.</a:t>
-            </a:r>
-            <a:endParaRPr lang="it-IT" sz="1600" dirty="0"/>
-          </a:p>
-        </p:txBody>
-      </p:sp>
     </p:spTree>
     <p:extLst>
       <p:ext uri="{BB962C8B-B14F-4D97-AF65-F5344CB8AC3E}">
@@ -8166,7 +8161,7 @@
         <p:spPr>
           <a:xfrm>
             <a:off x="7307156" y="3997399"/>
-            <a:ext cx="4139383" cy="2800767"/>
+            <a:ext cx="4550227" cy="2554545"/>
           </a:xfrm>
           <a:prstGeom prst="rect">
             <a:avLst/>
@@ -8227,7 +8222,7 @@
             </a:pPr>
             <a:r>
               <a:rPr lang="en-US" sz="1600" dirty="0"/>
-              <a:t>The MCU exposes a web interface through an http server to monitor and control the system.</a:t>
+              <a:t>The MCU exposes a web interface (implemented in Vue.js) through an HTTP server to monitor and control the system.</a:t>
             </a:r>
           </a:p>
         </p:txBody>
@@ -10220,6 +10215,133 @@
 </p:sld>
 </file>
 
+<file path=ppt/slides/slide6.xml><?xml version="1.0" encoding="utf-8"?>
+<p:sld xmlns:a="http://schemas.openxmlformats.org/drawingml/2006/main" xmlns:r="http://schemas.openxmlformats.org/officeDocument/2006/relationships" xmlns:p="http://schemas.openxmlformats.org/presentationml/2006/main">
+  <p:cSld>
+    <p:spTree>
+      <p:nvGrpSpPr>
+        <p:cNvPr id="1" name=""/>
+        <p:cNvGrpSpPr/>
+        <p:nvPr/>
+      </p:nvGrpSpPr>
+      <p:grpSpPr>
+        <a:xfrm>
+          <a:off x="0" y="0"/>
+          <a:ext cx="0" cy="0"/>
+          <a:chOff x="0" y="0"/>
+          <a:chExt cx="0" cy="0"/>
+        </a:xfrm>
+      </p:grpSpPr>
+      <p:sp>
+        <p:nvSpPr>
+          <p:cNvPr id="2" name="Slide Number Placeholder 1"/>
+          <p:cNvSpPr>
+            <a:spLocks noGrp="1"/>
+          </p:cNvSpPr>
+          <p:nvPr>
+            <p:ph type="sldNum" sz="quarter" idx="10"/>
+          </p:nvPr>
+        </p:nvSpPr>
+        <p:spPr/>
+        <p:txBody>
+          <a:bodyPr/>
+          <a:lstStyle/>
+          <a:p>
+            <a:fld id="{D8D877B3-D348-4611-9BDB-C5374591D951}" type="slidenum">
+              <a:rPr lang="en-US" smtClean="0"/>
+              <a:pPr/>
+              <a:t>6</a:t>
+            </a:fld>
+            <a:endParaRPr lang="en-US" dirty="0"/>
+          </a:p>
+        </p:txBody>
+      </p:sp>
+      <p:sp>
+        <p:nvSpPr>
+          <p:cNvPr id="3" name="Title 2"/>
+          <p:cNvSpPr>
+            <a:spLocks noGrp="1"/>
+          </p:cNvSpPr>
+          <p:nvPr>
+            <p:ph type="title"/>
+          </p:nvPr>
+        </p:nvSpPr>
+        <p:spPr>
+          <a:xfrm>
+            <a:off x="1866899" y="996124"/>
+            <a:ext cx="5373349" cy="673745"/>
+          </a:xfrm>
+        </p:spPr>
+        <p:txBody>
+          <a:bodyPr/>
+          <a:lstStyle/>
+          <a:p>
+            <a:r>
+              <a:rPr lang="en-US" dirty="0">
+                <a:latin typeface="Montserrat" panose="00000500000000000000" pitchFamily="50" charset="0"/>
+              </a:rPr>
+              <a:t>Final Remarks</a:t>
+            </a:r>
+            <a:r>
+              <a:rPr lang="en-US" b="1" dirty="0">
+                <a:solidFill>
+                  <a:srgbClr val="92D050"/>
+                </a:solidFill>
+                <a:latin typeface="Montserrat" panose="00000500000000000000" pitchFamily="50" charset="0"/>
+              </a:rPr>
+              <a:t>.</a:t>
+            </a:r>
+          </a:p>
+        </p:txBody>
+      </p:sp>
+      <p:pic>
+        <p:nvPicPr>
+          <p:cNvPr id="6" name="Immagine 5">
+            <a:extLst>
+              <a:ext uri="{FF2B5EF4-FFF2-40B4-BE49-F238E27FC236}">
+                <a16:creationId xmlns:a16="http://schemas.microsoft.com/office/drawing/2014/main" id="{F56CAFE9-187B-4B84-B4B3-9566801433C0}"/>
+              </a:ext>
+            </a:extLst>
+          </p:cNvPr>
+          <p:cNvPicPr>
+            <a:picLocks noChangeAspect="1"/>
+          </p:cNvPicPr>
+          <p:nvPr/>
+        </p:nvPicPr>
+        <p:blipFill rotWithShape="1">
+          <a:blip r:embed="rId2">
+            <a:extLst>
+              <a:ext uri="{28A0092B-C50C-407E-A947-70E740481C1C}">
+                <a14:useLocalDpi xmlns:a14="http://schemas.microsoft.com/office/drawing/2010/main" val="0"/>
+              </a:ext>
+            </a:extLst>
+          </a:blip>
+          <a:srcRect b="12251"/>
+          <a:stretch/>
+        </p:blipFill>
+        <p:spPr>
+          <a:xfrm>
+            <a:off x="2501348" y="1792255"/>
+            <a:ext cx="7189304" cy="4731400"/>
+          </a:xfrm>
+          <a:prstGeom prst="rect">
+            <a:avLst/>
+          </a:prstGeom>
+        </p:spPr>
+      </p:pic>
+    </p:spTree>
+    <p:extLst>
+      <p:ext uri="{BB962C8B-B14F-4D97-AF65-F5344CB8AC3E}">
+        <p14:creationId xmlns:p14="http://schemas.microsoft.com/office/powerpoint/2010/main" val="2268301522"/>
+      </p:ext>
+    </p:extLst>
+  </p:cSld>
+  <p:clrMapOvr>
+    <a:masterClrMapping/>
+  </p:clrMapOvr>
+</p:sld>
+</file>
+
 <file path=ppt/theme/theme1.xml><?xml version="1.0" encoding="utf-8"?>
 <a:theme xmlns:a="http://schemas.openxmlformats.org/drawingml/2006/main" name="B&amp;D-Powerpoint Template_16x9">
   <a:themeElements>

</xml_diff>